<commit_message>
hive uygulama notları eklendi
</commit_message>
<xml_diff>
--- a/04-Buyuk-Veri-Sorgulama/01_apache_hive_teori.pptx
+++ b/04-Buyuk-Veri-Sorgulama/01_apache_hive_teori.pptx
@@ -5,16 +5,18 @@
     <p:sldMasterId id="2147483648" r:id="rId1"/>
   </p:sldMasterIdLst>
   <p:notesMasterIdLst>
-    <p:notesMasterId r:id="rId9"/>
+    <p:notesMasterId r:id="rId11"/>
   </p:notesMasterIdLst>
   <p:sldIdLst>
     <p:sldId id="257" r:id="rId2"/>
     <p:sldId id="258" r:id="rId3"/>
     <p:sldId id="259" r:id="rId4"/>
     <p:sldId id="260" r:id="rId5"/>
-    <p:sldId id="261" r:id="rId6"/>
-    <p:sldId id="262" r:id="rId7"/>
-    <p:sldId id="263" r:id="rId8"/>
+    <p:sldId id="264" r:id="rId6"/>
+    <p:sldId id="265" r:id="rId7"/>
+    <p:sldId id="261" r:id="rId8"/>
+    <p:sldId id="262" r:id="rId9"/>
+    <p:sldId id="263" r:id="rId10"/>
   </p:sldIdLst>
   <p:sldSz cx="12192000" cy="6858000"/>
   <p:notesSz cx="6858000" cy="9144000"/>
@@ -502,7 +504,7 @@
           <a:p>
             <a:fld id="{6F77F576-AE14-466D-AA6B-335273622B21}" type="datetimeFigureOut">
               <a:rPr lang="en-US" smtClean="0"/>
-              <a:t>7/23/2019</a:t>
+              <a:t>10/9/2019</a:t>
             </a:fld>
             <a:endParaRPr lang="en-US"/>
           </a:p>
@@ -901,7 +903,7 @@
           <a:p>
             <a:fld id="{54AA066D-271F-4C1A-B89A-0705A7689EE9}" type="datetimeFigureOut">
               <a:rPr lang="en-US" smtClean="0"/>
-              <a:t>7/23/2019</a:t>
+              <a:t>10/9/2019</a:t>
             </a:fld>
             <a:endParaRPr lang="en-US"/>
           </a:p>
@@ -1071,7 +1073,7 @@
           <a:p>
             <a:fld id="{54AA066D-271F-4C1A-B89A-0705A7689EE9}" type="datetimeFigureOut">
               <a:rPr lang="en-US" smtClean="0"/>
-              <a:t>7/23/2019</a:t>
+              <a:t>10/9/2019</a:t>
             </a:fld>
             <a:endParaRPr lang="en-US"/>
           </a:p>
@@ -1251,7 +1253,7 @@
           <a:p>
             <a:fld id="{54AA066D-271F-4C1A-B89A-0705A7689EE9}" type="datetimeFigureOut">
               <a:rPr lang="en-US" smtClean="0"/>
-              <a:t>7/23/2019</a:t>
+              <a:t>10/9/2019</a:t>
             </a:fld>
             <a:endParaRPr lang="en-US"/>
           </a:p>
@@ -1421,7 +1423,7 @@
           <a:p>
             <a:fld id="{54AA066D-271F-4C1A-B89A-0705A7689EE9}" type="datetimeFigureOut">
               <a:rPr lang="en-US" smtClean="0"/>
-              <a:t>7/23/2019</a:t>
+              <a:t>10/9/2019</a:t>
             </a:fld>
             <a:endParaRPr lang="en-US"/>
           </a:p>
@@ -1667,7 +1669,7 @@
           <a:p>
             <a:fld id="{54AA066D-271F-4C1A-B89A-0705A7689EE9}" type="datetimeFigureOut">
               <a:rPr lang="en-US" smtClean="0"/>
-              <a:t>7/23/2019</a:t>
+              <a:t>10/9/2019</a:t>
             </a:fld>
             <a:endParaRPr lang="en-US"/>
           </a:p>
@@ -1899,7 +1901,7 @@
           <a:p>
             <a:fld id="{54AA066D-271F-4C1A-B89A-0705A7689EE9}" type="datetimeFigureOut">
               <a:rPr lang="en-US" smtClean="0"/>
-              <a:t>7/23/2019</a:t>
+              <a:t>10/9/2019</a:t>
             </a:fld>
             <a:endParaRPr lang="en-US"/>
           </a:p>
@@ -2266,7 +2268,7 @@
           <a:p>
             <a:fld id="{54AA066D-271F-4C1A-B89A-0705A7689EE9}" type="datetimeFigureOut">
               <a:rPr lang="en-US" smtClean="0"/>
-              <a:t>7/23/2019</a:t>
+              <a:t>10/9/2019</a:t>
             </a:fld>
             <a:endParaRPr lang="en-US"/>
           </a:p>
@@ -2384,7 +2386,7 @@
           <a:p>
             <a:fld id="{54AA066D-271F-4C1A-B89A-0705A7689EE9}" type="datetimeFigureOut">
               <a:rPr lang="en-US" smtClean="0"/>
-              <a:t>7/23/2019</a:t>
+              <a:t>10/9/2019</a:t>
             </a:fld>
             <a:endParaRPr lang="en-US"/>
           </a:p>
@@ -2479,7 +2481,7 @@
           <a:p>
             <a:fld id="{54AA066D-271F-4C1A-B89A-0705A7689EE9}" type="datetimeFigureOut">
               <a:rPr lang="en-US" smtClean="0"/>
-              <a:t>7/23/2019</a:t>
+              <a:t>10/9/2019</a:t>
             </a:fld>
             <a:endParaRPr lang="en-US"/>
           </a:p>
@@ -2756,7 +2758,7 @@
           <a:p>
             <a:fld id="{54AA066D-271F-4C1A-B89A-0705A7689EE9}" type="datetimeFigureOut">
               <a:rPr lang="en-US" smtClean="0"/>
-              <a:t>7/23/2019</a:t>
+              <a:t>10/9/2019</a:t>
             </a:fld>
             <a:endParaRPr lang="en-US"/>
           </a:p>
@@ -3009,7 +3011,7 @@
           <a:p>
             <a:fld id="{54AA066D-271F-4C1A-B89A-0705A7689EE9}" type="datetimeFigureOut">
               <a:rPr lang="en-US" smtClean="0"/>
-              <a:t>7/23/2019</a:t>
+              <a:t>10/9/2019</a:t>
             </a:fld>
             <a:endParaRPr lang="en-US"/>
           </a:p>
@@ -3222,7 +3224,7 @@
           <a:p>
             <a:fld id="{54AA066D-271F-4C1A-B89A-0705A7689EE9}" type="datetimeFigureOut">
               <a:rPr lang="en-US" smtClean="0"/>
-              <a:t>7/23/2019</a:t>
+              <a:t>10/9/2019</a:t>
             </a:fld>
             <a:endParaRPr lang="en-US"/>
           </a:p>
@@ -5177,6 +5179,52 @@
           </a:p>
         </p:txBody>
       </p:sp>
+      <p:sp>
+        <p:nvSpPr>
+          <p:cNvPr id="2" name="Metin kutusu 1">
+            <a:extLst>
+              <a:ext uri="{FF2B5EF4-FFF2-40B4-BE49-F238E27FC236}">
+                <a16:creationId xmlns:a16="http://schemas.microsoft.com/office/drawing/2014/main" id="{D3C82A0D-1BCB-422E-9C3C-E63C4AE68781}"/>
+              </a:ext>
+            </a:extLst>
+          </p:cNvPr>
+          <p:cNvSpPr txBox="1"/>
+          <p:nvPr/>
+        </p:nvSpPr>
+        <p:spPr>
+          <a:xfrm>
+            <a:off x="3096775" y="1633123"/>
+            <a:ext cx="6032311" cy="3046988"/>
+          </a:xfrm>
+          <a:prstGeom prst="rect">
+            <a:avLst/>
+          </a:prstGeom>
+          <a:solidFill>
+            <a:srgbClr val="FFC000"/>
+          </a:solidFill>
+        </p:spPr>
+        <p:txBody>
+          <a:bodyPr wrap="square" rtlCol="0">
+            <a:spAutoFit/>
+          </a:bodyPr>
+          <a:lstStyle/>
+          <a:p>
+            <a:pPr algn="ctr"/>
+            <a:r>
+              <a:rPr lang="tr-TR" sz="4800" dirty="0"/>
+              <a:t>Onlarca satır MapReduce kodu ile yapılan iş, bir satır </a:t>
+            </a:r>
+            <a:r>
+              <a:rPr lang="tr-TR" sz="4800" dirty="0" err="1"/>
+              <a:t>Hive</a:t>
+            </a:r>
+            <a:r>
+              <a:rPr lang="tr-TR" sz="4800" dirty="0"/>
+              <a:t> sorgusu ile yapılabilir.</a:t>
+            </a:r>
+          </a:p>
+        </p:txBody>
+      </p:sp>
     </p:spTree>
     <p:extLst>
       <p:ext uri="{BB962C8B-B14F-4D97-AF65-F5344CB8AC3E}">
@@ -5187,6 +5235,84 @@
   <p:clrMapOvr>
     <a:masterClrMapping/>
   </p:clrMapOvr>
+  <p:timing>
+    <p:tnLst>
+      <p:par>
+        <p:cTn id="1" dur="indefinite" restart="never" nodeType="tmRoot">
+          <p:childTnLst>
+            <p:seq concurrent="1" nextAc="seek">
+              <p:cTn id="2" dur="indefinite" nodeType="mainSeq">
+                <p:childTnLst>
+                  <p:par>
+                    <p:cTn id="3" fill="hold">
+                      <p:stCondLst>
+                        <p:cond delay="indefinite"/>
+                      </p:stCondLst>
+                      <p:childTnLst>
+                        <p:par>
+                          <p:cTn id="4" fill="hold">
+                            <p:stCondLst>
+                              <p:cond delay="0"/>
+                            </p:stCondLst>
+                            <p:childTnLst>
+                              <p:par>
+                                <p:cTn id="5" presetID="1" presetClass="entr" presetSubtype="0" fill="hold" grpId="0" nodeType="clickEffect">
+                                  <p:stCondLst>
+                                    <p:cond delay="0"/>
+                                  </p:stCondLst>
+                                  <p:childTnLst>
+                                    <p:set>
+                                      <p:cBhvr>
+                                        <p:cTn id="6" dur="1" fill="hold">
+                                          <p:stCondLst>
+                                            <p:cond delay="0"/>
+                                          </p:stCondLst>
+                                        </p:cTn>
+                                        <p:tgtEl>
+                                          <p:spTgt spid="2"/>
+                                        </p:tgtEl>
+                                        <p:attrNameLst>
+                                          <p:attrName>style.visibility</p:attrName>
+                                        </p:attrNameLst>
+                                      </p:cBhvr>
+                                      <p:to>
+                                        <p:strVal val="visible"/>
+                                      </p:to>
+                                    </p:set>
+                                  </p:childTnLst>
+                                </p:cTn>
+                              </p:par>
+                            </p:childTnLst>
+                          </p:cTn>
+                        </p:par>
+                      </p:childTnLst>
+                    </p:cTn>
+                  </p:par>
+                </p:childTnLst>
+              </p:cTn>
+              <p:prevCondLst>
+                <p:cond evt="onPrev" delay="0">
+                  <p:tgtEl>
+                    <p:sldTgt/>
+                  </p:tgtEl>
+                </p:cond>
+              </p:prevCondLst>
+              <p:nextCondLst>
+                <p:cond evt="onNext" delay="0">
+                  <p:tgtEl>
+                    <p:sldTgt/>
+                  </p:tgtEl>
+                </p:cond>
+              </p:nextCondLst>
+            </p:seq>
+          </p:childTnLst>
+        </p:cTn>
+      </p:par>
+    </p:tnLst>
+    <p:bldLst>
+      <p:bldP spid="2" grpId="0" animBg="1"/>
+    </p:bldLst>
+  </p:timing>
 </p:sld>
 </file>
 
@@ -6501,6 +6627,17 @@
               </a:rPr>
               <a:t>Hive</a:t>
             </a:r>
+            <a:r>
+              <a:rPr lang="tr-TR" sz="3600" b="1" dirty="0">
+                <a:solidFill>
+                  <a:srgbClr val="CD1F26"/>
+                </a:solidFill>
+                <a:latin typeface="Arial" panose="020B0604020202020204" pitchFamily="34" charset="0"/>
+                <a:ea typeface="Verdana" panose="020B0604030504040204" pitchFamily="34" charset="0"/>
+                <a:cs typeface="Arial" panose="020B0604020202020204" pitchFamily="34" charset="0"/>
+              </a:rPr>
+              <a:t> Nedir?</a:t>
+            </a:r>
             <a:endParaRPr lang="en-US" sz="3600" b="1" dirty="0">
               <a:solidFill>
                 <a:srgbClr val="CD1F26"/>
@@ -6514,224 +6651,14 @@
       </p:sp>
       <p:sp>
         <p:nvSpPr>
-          <p:cNvPr id="2" name="Dikdörtgen 1"/>
-          <p:cNvSpPr/>
-          <p:nvPr/>
-        </p:nvSpPr>
-        <p:spPr>
-          <a:xfrm>
-            <a:off x="6014814" y="4357259"/>
-            <a:ext cx="4708634" cy="977463"/>
-          </a:xfrm>
-          <a:prstGeom prst="rect">
-            <a:avLst/>
-          </a:prstGeom>
-        </p:spPr>
-        <p:style>
-          <a:lnRef idx="1">
-            <a:schemeClr val="accent2"/>
-          </a:lnRef>
-          <a:fillRef idx="3">
-            <a:schemeClr val="accent2"/>
-          </a:fillRef>
-          <a:effectRef idx="2">
-            <a:schemeClr val="accent2"/>
-          </a:effectRef>
-          <a:fontRef idx="minor">
-            <a:schemeClr val="lt1"/>
-          </a:fontRef>
-        </p:style>
-        <p:txBody>
-          <a:bodyPr rtlCol="0" anchor="ctr"/>
-          <a:lstStyle/>
-          <a:p>
-            <a:pPr algn="ctr"/>
-            <a:r>
-              <a:rPr lang="tr-TR" sz="4000" dirty="0"/>
-              <a:t>HDFS</a:t>
-            </a:r>
-            <a:endParaRPr lang="en-US" sz="4000" dirty="0"/>
-          </a:p>
-        </p:txBody>
-      </p:sp>
-      <p:sp>
-        <p:nvSpPr>
-          <p:cNvPr id="21" name="Dikdörtgen 20"/>
-          <p:cNvSpPr/>
-          <p:nvPr/>
-        </p:nvSpPr>
-        <p:spPr>
-          <a:xfrm>
-            <a:off x="6007198" y="3318383"/>
-            <a:ext cx="4708634" cy="977463"/>
-          </a:xfrm>
-          <a:prstGeom prst="rect">
-            <a:avLst/>
-          </a:prstGeom>
-        </p:spPr>
-        <p:style>
-          <a:lnRef idx="1">
-            <a:schemeClr val="accent2"/>
-          </a:lnRef>
-          <a:fillRef idx="3">
-            <a:schemeClr val="accent2"/>
-          </a:fillRef>
-          <a:effectRef idx="2">
-            <a:schemeClr val="accent2"/>
-          </a:effectRef>
-          <a:fontRef idx="minor">
-            <a:schemeClr val="lt1"/>
-          </a:fontRef>
-        </p:style>
-        <p:txBody>
-          <a:bodyPr rtlCol="0" anchor="ctr"/>
-          <a:lstStyle/>
-          <a:p>
-            <a:pPr algn="ctr"/>
-            <a:r>
-              <a:rPr lang="tr-TR" sz="4000" dirty="0"/>
-              <a:t>YARN</a:t>
-            </a:r>
-            <a:endParaRPr lang="en-US" sz="4000" dirty="0"/>
-          </a:p>
-        </p:txBody>
-      </p:sp>
-      <p:sp>
-        <p:nvSpPr>
-          <p:cNvPr id="22" name="Dikdörtgen 21"/>
-          <p:cNvSpPr/>
-          <p:nvPr/>
-        </p:nvSpPr>
-        <p:spPr>
-          <a:xfrm>
-            <a:off x="6007199" y="2279510"/>
-            <a:ext cx="2319900" cy="977463"/>
-          </a:xfrm>
-          <a:prstGeom prst="rect">
-            <a:avLst/>
-          </a:prstGeom>
-        </p:spPr>
-        <p:style>
-          <a:lnRef idx="1">
-            <a:schemeClr val="accent2"/>
-          </a:lnRef>
-          <a:fillRef idx="3">
-            <a:schemeClr val="accent2"/>
-          </a:fillRef>
-          <a:effectRef idx="2">
-            <a:schemeClr val="accent2"/>
-          </a:effectRef>
-          <a:fontRef idx="minor">
-            <a:schemeClr val="lt1"/>
-          </a:fontRef>
-        </p:style>
-        <p:txBody>
-          <a:bodyPr rtlCol="0" anchor="ctr"/>
-          <a:lstStyle/>
-          <a:p>
-            <a:pPr algn="ctr"/>
-            <a:r>
-              <a:rPr lang="tr-TR" sz="3200" dirty="0"/>
-              <a:t>MapReduce</a:t>
-            </a:r>
-            <a:endParaRPr lang="en-US" sz="3200" dirty="0"/>
-          </a:p>
-        </p:txBody>
-      </p:sp>
-      <p:sp>
-        <p:nvSpPr>
-          <p:cNvPr id="23" name="Dikdörtgen 22"/>
-          <p:cNvSpPr/>
-          <p:nvPr/>
-        </p:nvSpPr>
-        <p:spPr>
-          <a:xfrm>
-            <a:off x="8410919" y="2279509"/>
-            <a:ext cx="2304913" cy="977463"/>
-          </a:xfrm>
-          <a:prstGeom prst="rect">
-            <a:avLst/>
-          </a:prstGeom>
-        </p:spPr>
-        <p:style>
-          <a:lnRef idx="1">
-            <a:schemeClr val="accent2"/>
-          </a:lnRef>
-          <a:fillRef idx="3">
-            <a:schemeClr val="accent2"/>
-          </a:fillRef>
-          <a:effectRef idx="2">
-            <a:schemeClr val="accent2"/>
-          </a:effectRef>
-          <a:fontRef idx="minor">
-            <a:schemeClr val="lt1"/>
-          </a:fontRef>
-        </p:style>
-        <p:txBody>
-          <a:bodyPr rtlCol="0" anchor="ctr"/>
-          <a:lstStyle/>
-          <a:p>
-            <a:pPr algn="ctr"/>
-            <a:r>
-              <a:rPr lang="tr-TR" sz="4000" dirty="0"/>
-              <a:t>TEZ</a:t>
-            </a:r>
-            <a:endParaRPr lang="en-US" sz="4000" dirty="0"/>
-          </a:p>
-        </p:txBody>
-      </p:sp>
-      <p:sp>
-        <p:nvSpPr>
-          <p:cNvPr id="24" name="Dikdörtgen 23"/>
-          <p:cNvSpPr/>
-          <p:nvPr/>
-        </p:nvSpPr>
-        <p:spPr>
-          <a:xfrm>
-            <a:off x="6007198" y="1237343"/>
-            <a:ext cx="4708634" cy="977463"/>
-          </a:xfrm>
-          <a:prstGeom prst="rect">
-            <a:avLst/>
-          </a:prstGeom>
-        </p:spPr>
-        <p:style>
-          <a:lnRef idx="1">
-            <a:schemeClr val="accent2"/>
-          </a:lnRef>
-          <a:fillRef idx="3">
-            <a:schemeClr val="accent2"/>
-          </a:fillRef>
-          <a:effectRef idx="2">
-            <a:schemeClr val="accent2"/>
-          </a:effectRef>
-          <a:fontRef idx="minor">
-            <a:schemeClr val="lt1"/>
-          </a:fontRef>
-        </p:style>
-        <p:txBody>
-          <a:bodyPr rtlCol="0" anchor="ctr"/>
-          <a:lstStyle/>
-          <a:p>
-            <a:pPr algn="ctr"/>
-            <a:r>
-              <a:rPr lang="tr-TR" sz="4000" dirty="0" err="1"/>
-              <a:t>Hive</a:t>
-            </a:r>
-            <a:endParaRPr lang="en-US" sz="4000" dirty="0"/>
-          </a:p>
-        </p:txBody>
-      </p:sp>
-      <p:sp>
-        <p:nvSpPr>
           <p:cNvPr id="9" name="Metin kutusu 8"/>
           <p:cNvSpPr txBox="1"/>
           <p:nvPr/>
         </p:nvSpPr>
         <p:spPr>
           <a:xfrm>
-            <a:off x="762704" y="913658"/>
-            <a:ext cx="4325259" cy="4524315"/>
+            <a:off x="1514543" y="858921"/>
+            <a:ext cx="9397296" cy="5021055"/>
           </a:xfrm>
           <a:prstGeom prst="rect">
             <a:avLst/>
@@ -6753,7 +6680,7 @@
             </a:pPr>
             <a:r>
               <a:rPr lang="tr-TR" sz="2400" dirty="0"/>
-              <a:t>Kullanıcılar SQL kullanıyor</a:t>
+              <a:t>HDFS üzerinde saklanan verileri SQL benzeri bir dile ile sorgulanmasına olanak sağlar.</a:t>
             </a:r>
           </a:p>
           <a:p>
@@ -6766,7 +6693,7 @@
             </a:pPr>
             <a:r>
               <a:rPr lang="tr-TR" sz="2400" dirty="0"/>
-              <a:t>Birçok SQL özellikleri ve standardı geçerli </a:t>
+              <a:t>Menşei Facebook’tur. Sonradan Apache topluluğuna devredilmiştir.</a:t>
             </a:r>
           </a:p>
           <a:p>
@@ -6779,7 +6706,7 @@
             </a:pPr>
             <a:r>
               <a:rPr lang="tr-TR" sz="2400" dirty="0"/>
-              <a:t>YARN uygulaması (MapReduce veya Tez)</a:t>
+              <a:t>Tablo içinde saklanabilen yapısal veriyi işler. </a:t>
             </a:r>
           </a:p>
           <a:p>
@@ -6792,7 +6719,23 @@
             </a:pPr>
             <a:r>
               <a:rPr lang="tr-TR" sz="2400" dirty="0"/>
-              <a:t>Veri tabanı tadında ancak veri tabanı değil</a:t>
+              <a:t>Gerçek zamanlı (akan veri) değil, parti veri işleme (</a:t>
+            </a:r>
+            <a:r>
+              <a:rPr lang="tr-TR" sz="2400" dirty="0" err="1"/>
+              <a:t>batch</a:t>
+            </a:r>
+            <a:r>
+              <a:rPr lang="tr-TR" sz="2400" dirty="0"/>
+              <a:t> </a:t>
+            </a:r>
+            <a:r>
+              <a:rPr lang="tr-TR" sz="2400" dirty="0" err="1"/>
+              <a:t>processing</a:t>
+            </a:r>
+            <a:r>
+              <a:rPr lang="tr-TR" sz="2400" dirty="0"/>
+              <a:t>)</a:t>
             </a:r>
           </a:p>
           <a:p>
@@ -6805,7 +6748,44 @@
             </a:pPr>
             <a:r>
               <a:rPr lang="tr-TR" sz="2400" dirty="0"/>
-              <a:t>HDFS dosyalarına sorgu imkanı</a:t>
+              <a:t>MapReduce ile HDFS üzerinde yapılan veri manipülasyonunun SQL kullanarak yapılmasına olanak sağlar.</a:t>
+            </a:r>
+          </a:p>
+          <a:p>
+            <a:pPr marL="285750" indent="-285750">
+              <a:lnSpc>
+                <a:spcPct val="150000"/>
+              </a:lnSpc>
+              <a:buFont typeface="Wingdings" panose="05000000000000000000" pitchFamily="2" charset="2"/>
+              <a:buChar char="ü"/>
+            </a:pPr>
+            <a:r>
+              <a:rPr lang="tr-TR" sz="2400" dirty="0"/>
+              <a:t>Bir çok farklı dosya formatını destekler: </a:t>
+            </a:r>
+            <a:r>
+              <a:rPr lang="tr-TR" sz="2400" dirty="0" err="1"/>
+              <a:t>Parquet</a:t>
+            </a:r>
+            <a:r>
+              <a:rPr lang="tr-TR" sz="2400" dirty="0"/>
+              <a:t>, </a:t>
+            </a:r>
+            <a:r>
+              <a:rPr lang="tr-TR" sz="2400" dirty="0" err="1"/>
+              <a:t>Sequence</a:t>
+            </a:r>
+            <a:r>
+              <a:rPr lang="tr-TR" sz="2400" dirty="0"/>
+              <a:t>, ORC, </a:t>
+            </a:r>
+            <a:r>
+              <a:rPr lang="tr-TR" sz="2400" dirty="0" err="1"/>
+              <a:t>Text</a:t>
+            </a:r>
+            <a:r>
+              <a:rPr lang="tr-TR" sz="2400" dirty="0"/>
+              <a:t> vb.</a:t>
             </a:r>
           </a:p>
         </p:txBody>
@@ -6813,7 +6793,7 @@
     </p:spTree>
     <p:extLst>
       <p:ext uri="{BB962C8B-B14F-4D97-AF65-F5344CB8AC3E}">
-        <p14:creationId xmlns:p14="http://schemas.microsoft.com/office/powerpoint/2010/main" val="4125060158"/>
+        <p14:creationId xmlns:p14="http://schemas.microsoft.com/office/powerpoint/2010/main" val="1411109692"/>
       </p:ext>
     </p:extLst>
   </p:cSld>
@@ -6900,6 +6880,673 @@
           <a:lstStyle/>
           <a:p>
             <a:r>
+              <a:rPr lang="tr-TR" sz="3600" b="1" dirty="0" err="1">
+                <a:solidFill>
+                  <a:srgbClr val="CD1F26"/>
+                </a:solidFill>
+                <a:latin typeface="Arial" panose="020B0604020202020204" pitchFamily="34" charset="0"/>
+                <a:ea typeface="Verdana" panose="020B0604030504040204" pitchFamily="34" charset="0"/>
+                <a:cs typeface="Arial" panose="020B0604020202020204" pitchFamily="34" charset="0"/>
+              </a:rPr>
+              <a:t>Hive</a:t>
+            </a:r>
+            <a:r>
+              <a:rPr lang="tr-TR" sz="3600" b="1" dirty="0">
+                <a:solidFill>
+                  <a:srgbClr val="CD1F26"/>
+                </a:solidFill>
+                <a:latin typeface="Arial" panose="020B0604020202020204" pitchFamily="34" charset="0"/>
+                <a:ea typeface="Verdana" panose="020B0604030504040204" pitchFamily="34" charset="0"/>
+                <a:cs typeface="Arial" panose="020B0604020202020204" pitchFamily="34" charset="0"/>
+              </a:rPr>
+              <a:t> Ne Değildir?</a:t>
+            </a:r>
+            <a:endParaRPr lang="en-US" sz="3600" b="1" dirty="0">
+              <a:solidFill>
+                <a:srgbClr val="CD1F26"/>
+              </a:solidFill>
+              <a:latin typeface="Arial" panose="020B0604020202020204" pitchFamily="34" charset="0"/>
+              <a:ea typeface="Verdana" panose="020B0604030504040204" pitchFamily="34" charset="0"/>
+              <a:cs typeface="Arial" panose="020B0604020202020204" pitchFamily="34" charset="0"/>
+            </a:endParaRPr>
+          </a:p>
+        </p:txBody>
+      </p:sp>
+      <p:sp>
+        <p:nvSpPr>
+          <p:cNvPr id="9" name="Metin kutusu 8"/>
+          <p:cNvSpPr txBox="1"/>
+          <p:nvPr/>
+        </p:nvSpPr>
+        <p:spPr>
+          <a:xfrm>
+            <a:off x="846161" y="858921"/>
+            <a:ext cx="10065678" cy="5021055"/>
+          </a:xfrm>
+          <a:prstGeom prst="rect">
+            <a:avLst/>
+          </a:prstGeom>
+          <a:noFill/>
+        </p:spPr>
+        <p:txBody>
+          <a:bodyPr wrap="square" rtlCol="0">
+            <a:spAutoFit/>
+          </a:bodyPr>
+          <a:lstStyle/>
+          <a:p>
+            <a:pPr marL="285750" indent="-285750">
+              <a:lnSpc>
+                <a:spcPct val="150000"/>
+              </a:lnSpc>
+              <a:buFont typeface="Wingdings" panose="05000000000000000000" pitchFamily="2" charset="2"/>
+              <a:buChar char="ü"/>
+            </a:pPr>
+            <a:r>
+              <a:rPr lang="tr-TR" sz="2400" dirty="0"/>
+              <a:t>Her şeyden önce veri tabanı değildir.</a:t>
+            </a:r>
+          </a:p>
+          <a:p>
+            <a:pPr marL="285750" indent="-285750">
+              <a:lnSpc>
+                <a:spcPct val="150000"/>
+              </a:lnSpc>
+              <a:buFont typeface="Wingdings" panose="05000000000000000000" pitchFamily="2" charset="2"/>
+              <a:buChar char="ü"/>
+            </a:pPr>
+            <a:r>
+              <a:rPr lang="tr-TR" sz="2400" dirty="0"/>
+              <a:t>Operasyonel veri tabanı ihtiyacını karşılamaz. Daha çok analitik büyük sorgular ve veri ambarı ihtiyaçlarına odaklanır.</a:t>
+            </a:r>
+          </a:p>
+          <a:p>
+            <a:pPr marL="285750" indent="-285750">
+              <a:lnSpc>
+                <a:spcPct val="150000"/>
+              </a:lnSpc>
+              <a:buFont typeface="Wingdings" panose="05000000000000000000" pitchFamily="2" charset="2"/>
+              <a:buChar char="ü"/>
+            </a:pPr>
+            <a:r>
+              <a:rPr lang="tr-TR" sz="2400" dirty="0"/>
+              <a:t>Satır bazlı insert, </a:t>
+            </a:r>
+            <a:r>
+              <a:rPr lang="tr-TR" sz="2400" dirty="0" err="1"/>
+              <a:t>update</a:t>
+            </a:r>
+            <a:r>
+              <a:rPr lang="tr-TR" sz="2400" dirty="0"/>
+              <a:t> ve </a:t>
+            </a:r>
+            <a:r>
+              <a:rPr lang="tr-TR" sz="2400" dirty="0" err="1"/>
+              <a:t>delete</a:t>
+            </a:r>
+            <a:r>
+              <a:rPr lang="tr-TR" sz="2400" dirty="0"/>
+              <a:t> için uygun değildir (son sürümlerde desteklense de oldukça yavaş)</a:t>
+            </a:r>
+          </a:p>
+          <a:p>
+            <a:pPr marL="285750" indent="-285750">
+              <a:lnSpc>
+                <a:spcPct val="150000"/>
+              </a:lnSpc>
+              <a:buFont typeface="Wingdings" panose="05000000000000000000" pitchFamily="2" charset="2"/>
+              <a:buChar char="ü"/>
+            </a:pPr>
+            <a:r>
+              <a:rPr lang="tr-TR" sz="2400" dirty="0" err="1"/>
+              <a:t>Interaktif</a:t>
+            </a:r>
+            <a:r>
+              <a:rPr lang="tr-TR" sz="2400" dirty="0"/>
+              <a:t> sorgular için uygun değildir. Sorgu cevabı için makul bir süre bekletir. Çünkü önce sorguyu </a:t>
+            </a:r>
+            <a:r>
+              <a:rPr lang="tr-TR" sz="2400" dirty="0" err="1"/>
+              <a:t>mapreduce</a:t>
+            </a:r>
+            <a:r>
+              <a:rPr lang="tr-TR" sz="2400" dirty="0"/>
+              <a:t> veya tez koduna çevirir sonra operasyona başlar.</a:t>
+            </a:r>
+          </a:p>
+          <a:p>
+            <a:pPr marL="285750" indent="-285750">
+              <a:lnSpc>
+                <a:spcPct val="150000"/>
+              </a:lnSpc>
+              <a:buFont typeface="Wingdings" panose="05000000000000000000" pitchFamily="2" charset="2"/>
+              <a:buChar char="ü"/>
+            </a:pPr>
+            <a:r>
+              <a:rPr lang="tr-TR" sz="2400" dirty="0" err="1"/>
+              <a:t>Hive</a:t>
+            </a:r>
+            <a:r>
+              <a:rPr lang="tr-TR" sz="2400" dirty="0"/>
+              <a:t> tam anlamıyla bir SQL değildir. SQL’de olan </a:t>
+            </a:r>
+            <a:r>
+              <a:rPr lang="tr-TR" sz="2400" dirty="0" err="1"/>
+              <a:t>herşeyi</a:t>
+            </a:r>
+            <a:r>
+              <a:rPr lang="tr-TR" sz="2400" dirty="0"/>
+              <a:t> </a:t>
+            </a:r>
+            <a:r>
+              <a:rPr lang="tr-TR" sz="2400" dirty="0" err="1"/>
+              <a:t>Hive’dan</a:t>
+            </a:r>
+            <a:r>
+              <a:rPr lang="tr-TR" sz="2400" dirty="0"/>
+              <a:t> beklemeyin.</a:t>
+            </a:r>
+          </a:p>
+        </p:txBody>
+      </p:sp>
+    </p:spTree>
+    <p:extLst>
+      <p:ext uri="{BB962C8B-B14F-4D97-AF65-F5344CB8AC3E}">
+        <p14:creationId xmlns:p14="http://schemas.microsoft.com/office/powerpoint/2010/main" val="1663770090"/>
+      </p:ext>
+    </p:extLst>
+  </p:cSld>
+  <p:clrMapOvr>
+    <a:masterClrMapping/>
+  </p:clrMapOvr>
+</p:sld>
+</file>
+
+<file path=ppt/slides/slide7.xml><?xml version="1.0" encoding="utf-8"?>
+<p:sld xmlns:a="http://schemas.openxmlformats.org/drawingml/2006/main" xmlns:r="http://schemas.openxmlformats.org/officeDocument/2006/relationships" xmlns:p="http://schemas.openxmlformats.org/presentationml/2006/main">
+  <p:cSld>
+    <p:spTree>
+      <p:nvGrpSpPr>
+        <p:cNvPr id="1" name=""/>
+        <p:cNvGrpSpPr/>
+        <p:nvPr/>
+      </p:nvGrpSpPr>
+      <p:grpSpPr>
+        <a:xfrm>
+          <a:off x="0" y="0"/>
+          <a:ext cx="0" cy="0"/>
+          <a:chOff x="0" y="0"/>
+          <a:chExt cx="0" cy="0"/>
+        </a:xfrm>
+      </p:grpSpPr>
+      <p:cxnSp>
+        <p:nvCxnSpPr>
+          <p:cNvPr id="10" name="Düz Bağlayıcı 9"/>
+          <p:cNvCxnSpPr/>
+          <p:nvPr/>
+        </p:nvCxnSpPr>
+        <p:spPr>
+          <a:xfrm>
+            <a:off x="228596" y="6166763"/>
+            <a:ext cx="11768671" cy="0"/>
+          </a:xfrm>
+          <a:prstGeom prst="line">
+            <a:avLst/>
+          </a:prstGeom>
+          <a:ln w="101600" cmpd="thickThin">
+            <a:solidFill>
+              <a:schemeClr val="accent1">
+                <a:lumMod val="75000"/>
+              </a:schemeClr>
+            </a:solidFill>
+          </a:ln>
+        </p:spPr>
+        <p:style>
+          <a:lnRef idx="1">
+            <a:schemeClr val="accent1"/>
+          </a:lnRef>
+          <a:fillRef idx="0">
+            <a:schemeClr val="accent1"/>
+          </a:fillRef>
+          <a:effectRef idx="0">
+            <a:schemeClr val="accent1"/>
+          </a:effectRef>
+          <a:fontRef idx="minor">
+            <a:schemeClr val="tx1"/>
+          </a:fontRef>
+        </p:style>
+      </p:cxnSp>
+      <p:sp>
+        <p:nvSpPr>
+          <p:cNvPr id="16" name="Unvan 1"/>
+          <p:cNvSpPr>
+            <a:spLocks noGrp="1"/>
+          </p:cNvSpPr>
+          <p:nvPr>
+            <p:ph type="ctrTitle"/>
+          </p:nvPr>
+        </p:nvSpPr>
+        <p:spPr>
+          <a:xfrm>
+            <a:off x="3689130" y="325820"/>
+            <a:ext cx="4672385" cy="533101"/>
+          </a:xfrm>
+        </p:spPr>
+        <p:txBody>
+          <a:bodyPr>
+            <a:noAutofit/>
+          </a:bodyPr>
+          <a:lstStyle/>
+          <a:p>
+            <a:r>
+              <a:rPr lang="tr-TR" sz="3600" b="1" dirty="0" err="1">
+                <a:solidFill>
+                  <a:srgbClr val="CD1F26"/>
+                </a:solidFill>
+                <a:latin typeface="Arial" panose="020B0604020202020204" pitchFamily="34" charset="0"/>
+                <a:ea typeface="Verdana" panose="020B0604030504040204" pitchFamily="34" charset="0"/>
+                <a:cs typeface="Arial" panose="020B0604020202020204" pitchFamily="34" charset="0"/>
+              </a:rPr>
+              <a:t>Hive</a:t>
+            </a:r>
+            <a:endParaRPr lang="en-US" sz="3600" b="1" dirty="0">
+              <a:solidFill>
+                <a:srgbClr val="CD1F26"/>
+              </a:solidFill>
+              <a:latin typeface="Arial" panose="020B0604020202020204" pitchFamily="34" charset="0"/>
+              <a:ea typeface="Verdana" panose="020B0604030504040204" pitchFamily="34" charset="0"/>
+              <a:cs typeface="Arial" panose="020B0604020202020204" pitchFamily="34" charset="0"/>
+            </a:endParaRPr>
+          </a:p>
+        </p:txBody>
+      </p:sp>
+      <p:sp>
+        <p:nvSpPr>
+          <p:cNvPr id="2" name="Dikdörtgen 1"/>
+          <p:cNvSpPr/>
+          <p:nvPr/>
+        </p:nvSpPr>
+        <p:spPr>
+          <a:xfrm>
+            <a:off x="6014814" y="4357259"/>
+            <a:ext cx="4708634" cy="977463"/>
+          </a:xfrm>
+          <a:prstGeom prst="rect">
+            <a:avLst/>
+          </a:prstGeom>
+        </p:spPr>
+        <p:style>
+          <a:lnRef idx="1">
+            <a:schemeClr val="accent2"/>
+          </a:lnRef>
+          <a:fillRef idx="3">
+            <a:schemeClr val="accent2"/>
+          </a:fillRef>
+          <a:effectRef idx="2">
+            <a:schemeClr val="accent2"/>
+          </a:effectRef>
+          <a:fontRef idx="minor">
+            <a:schemeClr val="lt1"/>
+          </a:fontRef>
+        </p:style>
+        <p:txBody>
+          <a:bodyPr rtlCol="0" anchor="ctr"/>
+          <a:lstStyle/>
+          <a:p>
+            <a:pPr algn="ctr"/>
+            <a:r>
+              <a:rPr lang="tr-TR" sz="4000" dirty="0"/>
+              <a:t>HDFS</a:t>
+            </a:r>
+            <a:endParaRPr lang="en-US" sz="4000" dirty="0"/>
+          </a:p>
+        </p:txBody>
+      </p:sp>
+      <p:sp>
+        <p:nvSpPr>
+          <p:cNvPr id="21" name="Dikdörtgen 20"/>
+          <p:cNvSpPr/>
+          <p:nvPr/>
+        </p:nvSpPr>
+        <p:spPr>
+          <a:xfrm>
+            <a:off x="6007198" y="3318383"/>
+            <a:ext cx="4708634" cy="977463"/>
+          </a:xfrm>
+          <a:prstGeom prst="rect">
+            <a:avLst/>
+          </a:prstGeom>
+        </p:spPr>
+        <p:style>
+          <a:lnRef idx="1">
+            <a:schemeClr val="accent2"/>
+          </a:lnRef>
+          <a:fillRef idx="3">
+            <a:schemeClr val="accent2"/>
+          </a:fillRef>
+          <a:effectRef idx="2">
+            <a:schemeClr val="accent2"/>
+          </a:effectRef>
+          <a:fontRef idx="minor">
+            <a:schemeClr val="lt1"/>
+          </a:fontRef>
+        </p:style>
+        <p:txBody>
+          <a:bodyPr rtlCol="0" anchor="ctr"/>
+          <a:lstStyle/>
+          <a:p>
+            <a:pPr algn="ctr"/>
+            <a:r>
+              <a:rPr lang="tr-TR" sz="4000" dirty="0"/>
+              <a:t>YARN</a:t>
+            </a:r>
+            <a:endParaRPr lang="en-US" sz="4000" dirty="0"/>
+          </a:p>
+        </p:txBody>
+      </p:sp>
+      <p:sp>
+        <p:nvSpPr>
+          <p:cNvPr id="22" name="Dikdörtgen 21"/>
+          <p:cNvSpPr/>
+          <p:nvPr/>
+        </p:nvSpPr>
+        <p:spPr>
+          <a:xfrm>
+            <a:off x="6007199" y="2279510"/>
+            <a:ext cx="2319900" cy="977463"/>
+          </a:xfrm>
+          <a:prstGeom prst="rect">
+            <a:avLst/>
+          </a:prstGeom>
+        </p:spPr>
+        <p:style>
+          <a:lnRef idx="1">
+            <a:schemeClr val="accent2"/>
+          </a:lnRef>
+          <a:fillRef idx="3">
+            <a:schemeClr val="accent2"/>
+          </a:fillRef>
+          <a:effectRef idx="2">
+            <a:schemeClr val="accent2"/>
+          </a:effectRef>
+          <a:fontRef idx="minor">
+            <a:schemeClr val="lt1"/>
+          </a:fontRef>
+        </p:style>
+        <p:txBody>
+          <a:bodyPr rtlCol="0" anchor="ctr"/>
+          <a:lstStyle/>
+          <a:p>
+            <a:pPr algn="ctr"/>
+            <a:r>
+              <a:rPr lang="tr-TR" sz="3200" dirty="0"/>
+              <a:t>MapReduce</a:t>
+            </a:r>
+            <a:endParaRPr lang="en-US" sz="3200" dirty="0"/>
+          </a:p>
+        </p:txBody>
+      </p:sp>
+      <p:sp>
+        <p:nvSpPr>
+          <p:cNvPr id="23" name="Dikdörtgen 22"/>
+          <p:cNvSpPr/>
+          <p:nvPr/>
+        </p:nvSpPr>
+        <p:spPr>
+          <a:xfrm>
+            <a:off x="8410919" y="2279509"/>
+            <a:ext cx="2304913" cy="977463"/>
+          </a:xfrm>
+          <a:prstGeom prst="rect">
+            <a:avLst/>
+          </a:prstGeom>
+        </p:spPr>
+        <p:style>
+          <a:lnRef idx="1">
+            <a:schemeClr val="accent2"/>
+          </a:lnRef>
+          <a:fillRef idx="3">
+            <a:schemeClr val="accent2"/>
+          </a:fillRef>
+          <a:effectRef idx="2">
+            <a:schemeClr val="accent2"/>
+          </a:effectRef>
+          <a:fontRef idx="minor">
+            <a:schemeClr val="lt1"/>
+          </a:fontRef>
+        </p:style>
+        <p:txBody>
+          <a:bodyPr rtlCol="0" anchor="ctr"/>
+          <a:lstStyle/>
+          <a:p>
+            <a:pPr algn="ctr"/>
+            <a:r>
+              <a:rPr lang="tr-TR" sz="4000" dirty="0"/>
+              <a:t>TEZ</a:t>
+            </a:r>
+            <a:endParaRPr lang="en-US" sz="4000" dirty="0"/>
+          </a:p>
+        </p:txBody>
+      </p:sp>
+      <p:sp>
+        <p:nvSpPr>
+          <p:cNvPr id="24" name="Dikdörtgen 23"/>
+          <p:cNvSpPr/>
+          <p:nvPr/>
+        </p:nvSpPr>
+        <p:spPr>
+          <a:xfrm>
+            <a:off x="6007198" y="1237343"/>
+            <a:ext cx="4708634" cy="977463"/>
+          </a:xfrm>
+          <a:prstGeom prst="rect">
+            <a:avLst/>
+          </a:prstGeom>
+        </p:spPr>
+        <p:style>
+          <a:lnRef idx="1">
+            <a:schemeClr val="accent2"/>
+          </a:lnRef>
+          <a:fillRef idx="3">
+            <a:schemeClr val="accent2"/>
+          </a:fillRef>
+          <a:effectRef idx="2">
+            <a:schemeClr val="accent2"/>
+          </a:effectRef>
+          <a:fontRef idx="minor">
+            <a:schemeClr val="lt1"/>
+          </a:fontRef>
+        </p:style>
+        <p:txBody>
+          <a:bodyPr rtlCol="0" anchor="ctr"/>
+          <a:lstStyle/>
+          <a:p>
+            <a:pPr algn="ctr"/>
+            <a:r>
+              <a:rPr lang="tr-TR" sz="4000" dirty="0" err="1"/>
+              <a:t>Hive</a:t>
+            </a:r>
+            <a:endParaRPr lang="en-US" sz="4000" dirty="0"/>
+          </a:p>
+        </p:txBody>
+      </p:sp>
+      <p:sp>
+        <p:nvSpPr>
+          <p:cNvPr id="9" name="Metin kutusu 8"/>
+          <p:cNvSpPr txBox="1"/>
+          <p:nvPr/>
+        </p:nvSpPr>
+        <p:spPr>
+          <a:xfrm>
+            <a:off x="762704" y="913658"/>
+            <a:ext cx="4325259" cy="4524315"/>
+          </a:xfrm>
+          <a:prstGeom prst="rect">
+            <a:avLst/>
+          </a:prstGeom>
+          <a:noFill/>
+        </p:spPr>
+        <p:txBody>
+          <a:bodyPr wrap="square" rtlCol="0">
+            <a:spAutoFit/>
+          </a:bodyPr>
+          <a:lstStyle/>
+          <a:p>
+            <a:pPr marL="285750" indent="-285750">
+              <a:lnSpc>
+                <a:spcPct val="150000"/>
+              </a:lnSpc>
+              <a:buFont typeface="Wingdings" panose="05000000000000000000" pitchFamily="2" charset="2"/>
+              <a:buChar char="ü"/>
+            </a:pPr>
+            <a:r>
+              <a:rPr lang="tr-TR" sz="2400" dirty="0"/>
+              <a:t>Kullanıcılar SQL kullanıyor</a:t>
+            </a:r>
+          </a:p>
+          <a:p>
+            <a:pPr marL="285750" indent="-285750">
+              <a:lnSpc>
+                <a:spcPct val="150000"/>
+              </a:lnSpc>
+              <a:buFont typeface="Wingdings" panose="05000000000000000000" pitchFamily="2" charset="2"/>
+              <a:buChar char="ü"/>
+            </a:pPr>
+            <a:r>
+              <a:rPr lang="tr-TR" sz="2400" dirty="0"/>
+              <a:t>Birçok SQL özellikleri ve standardı geçerli </a:t>
+            </a:r>
+          </a:p>
+          <a:p>
+            <a:pPr marL="285750" indent="-285750">
+              <a:lnSpc>
+                <a:spcPct val="150000"/>
+              </a:lnSpc>
+              <a:buFont typeface="Wingdings" panose="05000000000000000000" pitchFamily="2" charset="2"/>
+              <a:buChar char="ü"/>
+            </a:pPr>
+            <a:r>
+              <a:rPr lang="tr-TR" sz="2400" dirty="0"/>
+              <a:t>YARN uygulaması (MapReduce veya Tez)</a:t>
+            </a:r>
+          </a:p>
+          <a:p>
+            <a:pPr marL="285750" indent="-285750">
+              <a:lnSpc>
+                <a:spcPct val="150000"/>
+              </a:lnSpc>
+              <a:buFont typeface="Wingdings" panose="05000000000000000000" pitchFamily="2" charset="2"/>
+              <a:buChar char="ü"/>
+            </a:pPr>
+            <a:r>
+              <a:rPr lang="tr-TR" sz="2400" b="1" dirty="0"/>
+              <a:t>Veri tabanı tadında ancak veri tabanı değil</a:t>
+            </a:r>
+          </a:p>
+          <a:p>
+            <a:pPr marL="285750" indent="-285750">
+              <a:lnSpc>
+                <a:spcPct val="150000"/>
+              </a:lnSpc>
+              <a:buFont typeface="Wingdings" panose="05000000000000000000" pitchFamily="2" charset="2"/>
+              <a:buChar char="ü"/>
+            </a:pPr>
+            <a:r>
+              <a:rPr lang="tr-TR" sz="2400" dirty="0"/>
+              <a:t>HDFS dosyalarına sorgu imkanı</a:t>
+            </a:r>
+          </a:p>
+        </p:txBody>
+      </p:sp>
+    </p:spTree>
+    <p:extLst>
+      <p:ext uri="{BB962C8B-B14F-4D97-AF65-F5344CB8AC3E}">
+        <p14:creationId xmlns:p14="http://schemas.microsoft.com/office/powerpoint/2010/main" val="4125060158"/>
+      </p:ext>
+    </p:extLst>
+  </p:cSld>
+  <p:clrMapOvr>
+    <a:masterClrMapping/>
+  </p:clrMapOvr>
+</p:sld>
+</file>
+
+<file path=ppt/slides/slide8.xml><?xml version="1.0" encoding="utf-8"?>
+<p:sld xmlns:a="http://schemas.openxmlformats.org/drawingml/2006/main" xmlns:r="http://schemas.openxmlformats.org/officeDocument/2006/relationships" xmlns:p="http://schemas.openxmlformats.org/presentationml/2006/main">
+  <p:cSld>
+    <p:spTree>
+      <p:nvGrpSpPr>
+        <p:cNvPr id="1" name=""/>
+        <p:cNvGrpSpPr/>
+        <p:nvPr/>
+      </p:nvGrpSpPr>
+      <p:grpSpPr>
+        <a:xfrm>
+          <a:off x="0" y="0"/>
+          <a:ext cx="0" cy="0"/>
+          <a:chOff x="0" y="0"/>
+          <a:chExt cx="0" cy="0"/>
+        </a:xfrm>
+      </p:grpSpPr>
+      <p:cxnSp>
+        <p:nvCxnSpPr>
+          <p:cNvPr id="10" name="Düz Bağlayıcı 9"/>
+          <p:cNvCxnSpPr/>
+          <p:nvPr/>
+        </p:nvCxnSpPr>
+        <p:spPr>
+          <a:xfrm>
+            <a:off x="228596" y="6166763"/>
+            <a:ext cx="11768671" cy="0"/>
+          </a:xfrm>
+          <a:prstGeom prst="line">
+            <a:avLst/>
+          </a:prstGeom>
+          <a:ln w="101600" cmpd="thickThin">
+            <a:solidFill>
+              <a:schemeClr val="accent1">
+                <a:lumMod val="75000"/>
+              </a:schemeClr>
+            </a:solidFill>
+          </a:ln>
+        </p:spPr>
+        <p:style>
+          <a:lnRef idx="1">
+            <a:schemeClr val="accent1"/>
+          </a:lnRef>
+          <a:fillRef idx="0">
+            <a:schemeClr val="accent1"/>
+          </a:fillRef>
+          <a:effectRef idx="0">
+            <a:schemeClr val="accent1"/>
+          </a:effectRef>
+          <a:fontRef idx="minor">
+            <a:schemeClr val="tx1"/>
+          </a:fontRef>
+        </p:style>
+      </p:cxnSp>
+      <p:sp>
+        <p:nvSpPr>
+          <p:cNvPr id="16" name="Unvan 1"/>
+          <p:cNvSpPr>
+            <a:spLocks noGrp="1"/>
+          </p:cNvSpPr>
+          <p:nvPr>
+            <p:ph type="ctrTitle"/>
+          </p:nvPr>
+        </p:nvSpPr>
+        <p:spPr>
+          <a:xfrm>
+            <a:off x="3689130" y="325820"/>
+            <a:ext cx="4672385" cy="533101"/>
+          </a:xfrm>
+        </p:spPr>
+        <p:txBody>
+          <a:bodyPr>
+            <a:noAutofit/>
+          </a:bodyPr>
+          <a:lstStyle/>
+          <a:p>
+            <a:r>
               <a:rPr lang="tr-TR" sz="3600" b="1" dirty="0">
                 <a:solidFill>
                   <a:srgbClr val="CD1F26"/>
@@ -7060,7 +7707,7 @@
 </p:sld>
 </file>
 
-<file path=ppt/slides/slide7.xml><?xml version="1.0" encoding="utf-8"?>
+<file path=ppt/slides/slide9.xml><?xml version="1.0" encoding="utf-8"?>
 <p:sld xmlns:a="http://schemas.openxmlformats.org/drawingml/2006/main" xmlns:r="http://schemas.openxmlformats.org/officeDocument/2006/relationships" xmlns:p="http://schemas.openxmlformats.org/presentationml/2006/main">
   <p:cSld>
     <p:spTree>

</xml_diff>